<commit_message>
added coin, health, buttons and small map
添加了金币，health脚本、血条，按钮，小地图
</commit_message>
<xml_diff>
--- a/TankHero.pptx
+++ b/TankHero.pptx
@@ -18,6 +18,9 @@
     <p:sldId id="270" r:id="rId12"/>
     <p:sldId id="271" r:id="rId13"/>
     <p:sldId id="272" r:id="rId14"/>
+    <p:sldId id="273" r:id="rId15"/>
+    <p:sldId id="274" r:id="rId16"/>
+    <p:sldId id="275" r:id="rId17"/>
   </p:sldIdLst>
   <p:sldSz cx="9144000" cy="6858000" type="screen4x3"/>
   <p:notesSz cx="6858000" cy="9144000"/>
@@ -300,7 +303,7 @@
           <a:p>
             <a:fld id="{EF65D2AA-D73F-470C-8AB1-14029EAFFB0B}" type="datetimeFigureOut">
               <a:rPr lang="zh-CN" altLang="en-US" smtClean="0"/>
-              <a:t>2015/1/29</a:t>
+              <a:t>2015/2/1</a:t>
             </a:fld>
             <a:endParaRPr lang="zh-CN" altLang="en-US"/>
           </a:p>
@@ -470,7 +473,7 @@
           <a:p>
             <a:fld id="{EF65D2AA-D73F-470C-8AB1-14029EAFFB0B}" type="datetimeFigureOut">
               <a:rPr lang="zh-CN" altLang="en-US" smtClean="0"/>
-              <a:t>2015/1/29</a:t>
+              <a:t>2015/2/1</a:t>
             </a:fld>
             <a:endParaRPr lang="zh-CN" altLang="en-US"/>
           </a:p>
@@ -650,7 +653,7 @@
           <a:p>
             <a:fld id="{EF65D2AA-D73F-470C-8AB1-14029EAFFB0B}" type="datetimeFigureOut">
               <a:rPr lang="zh-CN" altLang="en-US" smtClean="0"/>
-              <a:t>2015/1/29</a:t>
+              <a:t>2015/2/1</a:t>
             </a:fld>
             <a:endParaRPr lang="zh-CN" altLang="en-US"/>
           </a:p>
@@ -820,7 +823,7 @@
           <a:p>
             <a:fld id="{EF65D2AA-D73F-470C-8AB1-14029EAFFB0B}" type="datetimeFigureOut">
               <a:rPr lang="zh-CN" altLang="en-US" smtClean="0"/>
-              <a:t>2015/1/29</a:t>
+              <a:t>2015/2/1</a:t>
             </a:fld>
             <a:endParaRPr lang="zh-CN" altLang="en-US"/>
           </a:p>
@@ -1066,7 +1069,7 @@
           <a:p>
             <a:fld id="{EF65D2AA-D73F-470C-8AB1-14029EAFFB0B}" type="datetimeFigureOut">
               <a:rPr lang="zh-CN" altLang="en-US" smtClean="0"/>
-              <a:t>2015/1/29</a:t>
+              <a:t>2015/2/1</a:t>
             </a:fld>
             <a:endParaRPr lang="zh-CN" altLang="en-US"/>
           </a:p>
@@ -1354,7 +1357,7 @@
           <a:p>
             <a:fld id="{EF65D2AA-D73F-470C-8AB1-14029EAFFB0B}" type="datetimeFigureOut">
               <a:rPr lang="zh-CN" altLang="en-US" smtClean="0"/>
-              <a:t>2015/1/29</a:t>
+              <a:t>2015/2/1</a:t>
             </a:fld>
             <a:endParaRPr lang="zh-CN" altLang="en-US"/>
           </a:p>
@@ -1776,7 +1779,7 @@
           <a:p>
             <a:fld id="{EF65D2AA-D73F-470C-8AB1-14029EAFFB0B}" type="datetimeFigureOut">
               <a:rPr lang="zh-CN" altLang="en-US" smtClean="0"/>
-              <a:t>2015/1/29</a:t>
+              <a:t>2015/2/1</a:t>
             </a:fld>
             <a:endParaRPr lang="zh-CN" altLang="en-US"/>
           </a:p>
@@ -1894,7 +1897,7 @@
           <a:p>
             <a:fld id="{EF65D2AA-D73F-470C-8AB1-14029EAFFB0B}" type="datetimeFigureOut">
               <a:rPr lang="zh-CN" altLang="en-US" smtClean="0"/>
-              <a:t>2015/1/29</a:t>
+              <a:t>2015/2/1</a:t>
             </a:fld>
             <a:endParaRPr lang="zh-CN" altLang="en-US"/>
           </a:p>
@@ -1989,7 +1992,7 @@
           <a:p>
             <a:fld id="{EF65D2AA-D73F-470C-8AB1-14029EAFFB0B}" type="datetimeFigureOut">
               <a:rPr lang="zh-CN" altLang="en-US" smtClean="0"/>
-              <a:t>2015/1/29</a:t>
+              <a:t>2015/2/1</a:t>
             </a:fld>
             <a:endParaRPr lang="zh-CN" altLang="en-US"/>
           </a:p>
@@ -2266,7 +2269,7 @@
           <a:p>
             <a:fld id="{EF65D2AA-D73F-470C-8AB1-14029EAFFB0B}" type="datetimeFigureOut">
               <a:rPr lang="zh-CN" altLang="en-US" smtClean="0"/>
-              <a:t>2015/1/29</a:t>
+              <a:t>2015/2/1</a:t>
             </a:fld>
             <a:endParaRPr lang="zh-CN" altLang="en-US"/>
           </a:p>
@@ -2519,7 +2522,7 @@
           <a:p>
             <a:fld id="{EF65D2AA-D73F-470C-8AB1-14029EAFFB0B}" type="datetimeFigureOut">
               <a:rPr lang="zh-CN" altLang="en-US" smtClean="0"/>
-              <a:t>2015/1/29</a:t>
+              <a:t>2015/2/1</a:t>
             </a:fld>
             <a:endParaRPr lang="zh-CN" altLang="en-US"/>
           </a:p>
@@ -2732,7 +2735,7 @@
           <a:p>
             <a:fld id="{EF65D2AA-D73F-470C-8AB1-14029EAFFB0B}" type="datetimeFigureOut">
               <a:rPr lang="zh-CN" altLang="en-US" smtClean="0"/>
-              <a:t>2015/1/29</a:t>
+              <a:t>2015/2/1</a:t>
             </a:fld>
             <a:endParaRPr lang="zh-CN" altLang="en-US"/>
           </a:p>
@@ -5627,6 +5630,407 @@
     <p:extLst>
       <p:ext uri="{BB962C8B-B14F-4D97-AF65-F5344CB8AC3E}">
         <p14:creationId xmlns:p14="http://schemas.microsoft.com/office/powerpoint/2010/main" val="1254737290"/>
+      </p:ext>
+    </p:extLst>
+  </p:cSld>
+  <p:clrMapOvr>
+    <a:masterClrMapping/>
+  </p:clrMapOvr>
+</p:sld>
+</file>
+
+<file path=ppt/slides/slide14.xml><?xml version="1.0" encoding="utf-8"?>
+<p:sld xmlns:a="http://schemas.openxmlformats.org/drawingml/2006/main" xmlns:r="http://schemas.openxmlformats.org/officeDocument/2006/relationships" xmlns:p="http://schemas.openxmlformats.org/presentationml/2006/main">
+  <p:cSld>
+    <p:spTree>
+      <p:nvGrpSpPr>
+        <p:cNvPr id="1" name=""/>
+        <p:cNvGrpSpPr/>
+        <p:nvPr/>
+      </p:nvGrpSpPr>
+      <p:grpSpPr>
+        <a:xfrm>
+          <a:off x="0" y="0"/>
+          <a:ext cx="0" cy="0"/>
+          <a:chOff x="0" y="0"/>
+          <a:chExt cx="0" cy="0"/>
+        </a:xfrm>
+      </p:grpSpPr>
+      <p:sp>
+        <p:nvSpPr>
+          <p:cNvPr id="2" name="标题 1"/>
+          <p:cNvSpPr>
+            <a:spLocks noGrp="1"/>
+          </p:cNvSpPr>
+          <p:nvPr>
+            <p:ph type="title"/>
+          </p:nvPr>
+        </p:nvSpPr>
+        <p:spPr/>
+        <p:txBody>
+          <a:bodyPr/>
+          <a:lstStyle/>
+          <a:p>
+            <a:endParaRPr lang="zh-CN" altLang="en-US"/>
+          </a:p>
+        </p:txBody>
+      </p:sp>
+      <p:sp>
+        <p:nvSpPr>
+          <p:cNvPr id="6" name="任意多边形 5"/>
+          <p:cNvSpPr>
+            <a:spLocks noChangeAspect="1"/>
+          </p:cNvSpPr>
+          <p:nvPr/>
+        </p:nvSpPr>
+        <p:spPr>
+          <a:xfrm>
+            <a:off x="802779" y="2060848"/>
+            <a:ext cx="904613" cy="83568"/>
+          </a:xfrm>
+          <a:custGeom>
+            <a:avLst/>
+            <a:gdLst>
+              <a:gd name="connsiteX0" fmla="*/ 0 w 7538442"/>
+              <a:gd name="connsiteY0" fmla="*/ 0 h 4523065"/>
+              <a:gd name="connsiteX1" fmla="*/ 7538442 w 7538442"/>
+              <a:gd name="connsiteY1" fmla="*/ 0 h 4523065"/>
+              <a:gd name="connsiteX2" fmla="*/ 7538442 w 7538442"/>
+              <a:gd name="connsiteY2" fmla="*/ 4523065 h 4523065"/>
+              <a:gd name="connsiteX3" fmla="*/ 0 w 7538442"/>
+              <a:gd name="connsiteY3" fmla="*/ 4523065 h 4523065"/>
+              <a:gd name="connsiteX4" fmla="*/ 0 w 7538442"/>
+              <a:gd name="connsiteY4" fmla="*/ 0 h 4523065"/>
+            </a:gdLst>
+            <a:ahLst/>
+            <a:cxnLst>
+              <a:cxn ang="0">
+                <a:pos x="connsiteX0" y="connsiteY0"/>
+              </a:cxn>
+              <a:cxn ang="0">
+                <a:pos x="connsiteX1" y="connsiteY1"/>
+              </a:cxn>
+              <a:cxn ang="0">
+                <a:pos x="connsiteX2" y="connsiteY2"/>
+              </a:cxn>
+              <a:cxn ang="0">
+                <a:pos x="connsiteX3" y="connsiteY3"/>
+              </a:cxn>
+              <a:cxn ang="0">
+                <a:pos x="connsiteX4" y="connsiteY4"/>
+              </a:cxn>
+            </a:cxnLst>
+            <a:rect l="l" t="t" r="r" b="b"/>
+            <a:pathLst>
+              <a:path w="7538442" h="4523065">
+                <a:moveTo>
+                  <a:pt x="0" y="0"/>
+                </a:moveTo>
+                <a:lnTo>
+                  <a:pt x="7538442" y="0"/>
+                </a:lnTo>
+                <a:lnTo>
+                  <a:pt x="7538442" y="4523065"/>
+                </a:lnTo>
+                <a:lnTo>
+                  <a:pt x="0" y="4523065"/>
+                </a:lnTo>
+                <a:lnTo>
+                  <a:pt x="0" y="0"/>
+                </a:lnTo>
+                <a:close/>
+              </a:path>
+            </a:pathLst>
+          </a:custGeom>
+          <a:solidFill>
+            <a:srgbClr val="FF0000"/>
+          </a:solidFill>
+          <a:ln>
+            <a:noFill/>
+          </a:ln>
+        </p:spPr>
+        <p:style>
+          <a:lnRef idx="2">
+            <a:schemeClr val="accent2"/>
+          </a:lnRef>
+          <a:fillRef idx="1">
+            <a:schemeClr val="lt1"/>
+          </a:fillRef>
+          <a:effectRef idx="0">
+            <a:schemeClr val="accent2"/>
+          </a:effectRef>
+          <a:fontRef idx="minor">
+            <a:schemeClr val="dk1"/>
+          </a:fontRef>
+        </p:style>
+        <p:txBody>
+          <a:bodyPr spcFirstLastPara="0" vert="horz" wrap="square" lIns="247650" tIns="247650" rIns="247650" bIns="247650" numCol="1" spcCol="1270" anchor="ctr" anchorCtr="0">
+            <a:noAutofit/>
+          </a:bodyPr>
+          <a:lstStyle/>
+          <a:p>
+            <a:pPr lvl="0" algn="ctr" defTabSz="2889250">
+              <a:lnSpc>
+                <a:spcPct val="90000"/>
+              </a:lnSpc>
+              <a:spcBef>
+                <a:spcPct val="0"/>
+              </a:spcBef>
+              <a:spcAft>
+                <a:spcPct val="35000"/>
+              </a:spcAft>
+            </a:pPr>
+            <a:endParaRPr lang="zh-CN" altLang="en-US" sz="6500" kern="1200"/>
+          </a:p>
+        </p:txBody>
+      </p:sp>
+    </p:spTree>
+    <p:extLst>
+      <p:ext uri="{BB962C8B-B14F-4D97-AF65-F5344CB8AC3E}">
+        <p14:creationId xmlns:p14="http://schemas.microsoft.com/office/powerpoint/2010/main" val="1809559656"/>
+      </p:ext>
+    </p:extLst>
+  </p:cSld>
+  <p:clrMapOvr>
+    <a:masterClrMapping/>
+  </p:clrMapOvr>
+</p:sld>
+</file>
+
+<file path=ppt/slides/slide15.xml><?xml version="1.0" encoding="utf-8"?>
+<p:sld xmlns:a="http://schemas.openxmlformats.org/drawingml/2006/main" xmlns:r="http://schemas.openxmlformats.org/officeDocument/2006/relationships" xmlns:p="http://schemas.openxmlformats.org/presentationml/2006/main">
+  <p:cSld>
+    <p:spTree>
+      <p:nvGrpSpPr>
+        <p:cNvPr id="1" name=""/>
+        <p:cNvGrpSpPr/>
+        <p:nvPr/>
+      </p:nvGrpSpPr>
+      <p:grpSpPr>
+        <a:xfrm>
+          <a:off x="0" y="0"/>
+          <a:ext cx="0" cy="0"/>
+          <a:chOff x="0" y="0"/>
+          <a:chExt cx="0" cy="0"/>
+        </a:xfrm>
+      </p:grpSpPr>
+      <p:sp>
+        <p:nvSpPr>
+          <p:cNvPr id="2" name="标题 1"/>
+          <p:cNvSpPr>
+            <a:spLocks noGrp="1"/>
+          </p:cNvSpPr>
+          <p:nvPr>
+            <p:ph type="title"/>
+          </p:nvPr>
+        </p:nvSpPr>
+        <p:spPr/>
+        <p:txBody>
+          <a:bodyPr/>
+          <a:lstStyle/>
+          <a:p>
+            <a:endParaRPr lang="zh-CN" altLang="en-US"/>
+          </a:p>
+        </p:txBody>
+      </p:sp>
+      <p:pic>
+        <p:nvPicPr>
+          <p:cNvPr id="4" name="内容占位符 3"/>
+          <p:cNvPicPr>
+            <a:picLocks noGrp="1" noChangeAspect="1"/>
+          </p:cNvPicPr>
+          <p:nvPr>
+            <p:ph idx="1"/>
+          </p:nvPr>
+        </p:nvPicPr>
+        <p:blipFill>
+          <a:blip r:embed="rId2">
+            <a:extLst>
+              <a:ext uri="{28A0092B-C50C-407E-A947-70E740481C1C}">
+                <a14:useLocalDpi xmlns:a14="http://schemas.microsoft.com/office/drawing/2010/main" val="0"/>
+              </a:ext>
+            </a:extLst>
+          </a:blip>
+          <a:stretch>
+            <a:fillRect/>
+          </a:stretch>
+        </p:blipFill>
+        <p:spPr>
+          <a:xfrm>
+            <a:off x="4267200" y="3558381"/>
+            <a:ext cx="609600" cy="609600"/>
+          </a:xfrm>
+          <a:prstGeom prst="rect">
+            <a:avLst/>
+          </a:prstGeom>
+          <a:ln>
+            <a:noFill/>
+          </a:ln>
+          <a:effectLst>
+            <a:outerShdw blurRad="190500" algn="tl" rotWithShape="0">
+              <a:srgbClr val="000000">
+                <a:alpha val="70000"/>
+              </a:srgbClr>
+            </a:outerShdw>
+          </a:effectLst>
+        </p:spPr>
+      </p:pic>
+    </p:spTree>
+    <p:extLst>
+      <p:ext uri="{BB962C8B-B14F-4D97-AF65-F5344CB8AC3E}">
+        <p14:creationId xmlns:p14="http://schemas.microsoft.com/office/powerpoint/2010/main" val="2199982099"/>
+      </p:ext>
+    </p:extLst>
+  </p:cSld>
+  <p:clrMapOvr>
+    <a:masterClrMapping/>
+  </p:clrMapOvr>
+</p:sld>
+</file>
+
+<file path=ppt/slides/slide16.xml><?xml version="1.0" encoding="utf-8"?>
+<p:sld xmlns:a="http://schemas.openxmlformats.org/drawingml/2006/main" xmlns:r="http://schemas.openxmlformats.org/officeDocument/2006/relationships" xmlns:p="http://schemas.openxmlformats.org/presentationml/2006/main">
+  <p:cSld>
+    <p:spTree>
+      <p:nvGrpSpPr>
+        <p:cNvPr id="1" name=""/>
+        <p:cNvGrpSpPr/>
+        <p:nvPr/>
+      </p:nvGrpSpPr>
+      <p:grpSpPr>
+        <a:xfrm>
+          <a:off x="0" y="0"/>
+          <a:ext cx="0" cy="0"/>
+          <a:chOff x="0" y="0"/>
+          <a:chExt cx="0" cy="0"/>
+        </a:xfrm>
+      </p:grpSpPr>
+      <p:sp>
+        <p:nvSpPr>
+          <p:cNvPr id="2" name="标题 1"/>
+          <p:cNvSpPr>
+            <a:spLocks noGrp="1"/>
+          </p:cNvSpPr>
+          <p:nvPr>
+            <p:ph type="title"/>
+          </p:nvPr>
+        </p:nvSpPr>
+        <p:spPr/>
+        <p:txBody>
+          <a:bodyPr/>
+          <a:lstStyle/>
+          <a:p>
+            <a:endParaRPr lang="zh-CN" altLang="en-US"/>
+          </a:p>
+        </p:txBody>
+      </p:sp>
+      <p:sp>
+        <p:nvSpPr>
+          <p:cNvPr id="6" name="任意多边形 5"/>
+          <p:cNvSpPr/>
+          <p:nvPr/>
+        </p:nvSpPr>
+        <p:spPr>
+          <a:xfrm>
+            <a:off x="802778" y="1601648"/>
+            <a:ext cx="7538442" cy="4523065"/>
+          </a:xfrm>
+          <a:custGeom>
+            <a:avLst/>
+            <a:gdLst>
+              <a:gd name="connsiteX0" fmla="*/ 0 w 7538442"/>
+              <a:gd name="connsiteY0" fmla="*/ 0 h 4523065"/>
+              <a:gd name="connsiteX1" fmla="*/ 7538442 w 7538442"/>
+              <a:gd name="connsiteY1" fmla="*/ 0 h 4523065"/>
+              <a:gd name="connsiteX2" fmla="*/ 7538442 w 7538442"/>
+              <a:gd name="connsiteY2" fmla="*/ 4523065 h 4523065"/>
+              <a:gd name="connsiteX3" fmla="*/ 0 w 7538442"/>
+              <a:gd name="connsiteY3" fmla="*/ 4523065 h 4523065"/>
+              <a:gd name="connsiteX4" fmla="*/ 0 w 7538442"/>
+              <a:gd name="connsiteY4" fmla="*/ 0 h 4523065"/>
+            </a:gdLst>
+            <a:ahLst/>
+            <a:cxnLst>
+              <a:cxn ang="0">
+                <a:pos x="connsiteX0" y="connsiteY0"/>
+              </a:cxn>
+              <a:cxn ang="0">
+                <a:pos x="connsiteX1" y="connsiteY1"/>
+              </a:cxn>
+              <a:cxn ang="0">
+                <a:pos x="connsiteX2" y="connsiteY2"/>
+              </a:cxn>
+              <a:cxn ang="0">
+                <a:pos x="connsiteX3" y="connsiteY3"/>
+              </a:cxn>
+              <a:cxn ang="0">
+                <a:pos x="connsiteX4" y="connsiteY4"/>
+              </a:cxn>
+            </a:cxnLst>
+            <a:rect l="l" t="t" r="r" b="b"/>
+            <a:pathLst>
+              <a:path w="7538442" h="4523065">
+                <a:moveTo>
+                  <a:pt x="0" y="0"/>
+                </a:moveTo>
+                <a:lnTo>
+                  <a:pt x="7538442" y="0"/>
+                </a:lnTo>
+                <a:lnTo>
+                  <a:pt x="7538442" y="4523065"/>
+                </a:lnTo>
+                <a:lnTo>
+                  <a:pt x="0" y="4523065"/>
+                </a:lnTo>
+                <a:lnTo>
+                  <a:pt x="0" y="0"/>
+                </a:lnTo>
+                <a:close/>
+              </a:path>
+            </a:pathLst>
+          </a:custGeom>
+          <a:noFill/>
+          <a:ln w="76200"/>
+        </p:spPr>
+        <p:style>
+          <a:lnRef idx="2">
+            <a:schemeClr val="accent2"/>
+          </a:lnRef>
+          <a:fillRef idx="1">
+            <a:schemeClr val="lt1"/>
+          </a:fillRef>
+          <a:effectRef idx="0">
+            <a:schemeClr val="accent2"/>
+          </a:effectRef>
+          <a:fontRef idx="minor">
+            <a:schemeClr val="dk1"/>
+          </a:fontRef>
+        </p:style>
+        <p:txBody>
+          <a:bodyPr spcFirstLastPara="0" vert="horz" wrap="square" lIns="247650" tIns="247650" rIns="247650" bIns="247650" numCol="1" spcCol="1270" anchor="ctr" anchorCtr="0">
+            <a:noAutofit/>
+          </a:bodyPr>
+          <a:lstStyle/>
+          <a:p>
+            <a:pPr lvl="0" algn="ctr" defTabSz="2889250">
+              <a:lnSpc>
+                <a:spcPct val="90000"/>
+              </a:lnSpc>
+              <a:spcBef>
+                <a:spcPct val="0"/>
+              </a:spcBef>
+              <a:spcAft>
+                <a:spcPct val="35000"/>
+              </a:spcAft>
+            </a:pPr>
+            <a:endParaRPr lang="zh-CN" altLang="en-US" sz="6500" kern="1200"/>
+          </a:p>
+        </p:txBody>
+      </p:sp>
+    </p:spTree>
+    <p:extLst>
+      <p:ext uri="{BB962C8B-B14F-4D97-AF65-F5344CB8AC3E}">
+        <p14:creationId xmlns:p14="http://schemas.microsoft.com/office/powerpoint/2010/main" val="1691533334"/>
       </p:ext>
     </p:extLst>
   </p:cSld>

</xml_diff>

<commit_message>
add some sounds and explosion effect using Detonator
</commit_message>
<xml_diff>
--- a/TankHero.pptx
+++ b/TankHero.pptx
@@ -21,6 +21,7 @@
     <p:sldId id="273" r:id="rId15"/>
     <p:sldId id="274" r:id="rId16"/>
     <p:sldId id="275" r:id="rId17"/>
+    <p:sldId id="276" r:id="rId18"/>
   </p:sldIdLst>
   <p:sldSz cx="9144000" cy="6858000" type="screen4x3"/>
   <p:notesSz cx="6858000" cy="9144000"/>
@@ -303,7 +304,7 @@
           <a:p>
             <a:fld id="{EF65D2AA-D73F-470C-8AB1-14029EAFFB0B}" type="datetimeFigureOut">
               <a:rPr lang="zh-CN" altLang="en-US" smtClean="0"/>
-              <a:t>2015/2/1</a:t>
+              <a:t>2015/2/8</a:t>
             </a:fld>
             <a:endParaRPr lang="zh-CN" altLang="en-US"/>
           </a:p>
@@ -473,7 +474,7 @@
           <a:p>
             <a:fld id="{EF65D2AA-D73F-470C-8AB1-14029EAFFB0B}" type="datetimeFigureOut">
               <a:rPr lang="zh-CN" altLang="en-US" smtClean="0"/>
-              <a:t>2015/2/1</a:t>
+              <a:t>2015/2/8</a:t>
             </a:fld>
             <a:endParaRPr lang="zh-CN" altLang="en-US"/>
           </a:p>
@@ -653,7 +654,7 @@
           <a:p>
             <a:fld id="{EF65D2AA-D73F-470C-8AB1-14029EAFFB0B}" type="datetimeFigureOut">
               <a:rPr lang="zh-CN" altLang="en-US" smtClean="0"/>
-              <a:t>2015/2/1</a:t>
+              <a:t>2015/2/8</a:t>
             </a:fld>
             <a:endParaRPr lang="zh-CN" altLang="en-US"/>
           </a:p>
@@ -823,7 +824,7 @@
           <a:p>
             <a:fld id="{EF65D2AA-D73F-470C-8AB1-14029EAFFB0B}" type="datetimeFigureOut">
               <a:rPr lang="zh-CN" altLang="en-US" smtClean="0"/>
-              <a:t>2015/2/1</a:t>
+              <a:t>2015/2/8</a:t>
             </a:fld>
             <a:endParaRPr lang="zh-CN" altLang="en-US"/>
           </a:p>
@@ -1069,7 +1070,7 @@
           <a:p>
             <a:fld id="{EF65D2AA-D73F-470C-8AB1-14029EAFFB0B}" type="datetimeFigureOut">
               <a:rPr lang="zh-CN" altLang="en-US" smtClean="0"/>
-              <a:t>2015/2/1</a:t>
+              <a:t>2015/2/8</a:t>
             </a:fld>
             <a:endParaRPr lang="zh-CN" altLang="en-US"/>
           </a:p>
@@ -1357,7 +1358,7 @@
           <a:p>
             <a:fld id="{EF65D2AA-D73F-470C-8AB1-14029EAFFB0B}" type="datetimeFigureOut">
               <a:rPr lang="zh-CN" altLang="en-US" smtClean="0"/>
-              <a:t>2015/2/1</a:t>
+              <a:t>2015/2/8</a:t>
             </a:fld>
             <a:endParaRPr lang="zh-CN" altLang="en-US"/>
           </a:p>
@@ -1779,7 +1780,7 @@
           <a:p>
             <a:fld id="{EF65D2AA-D73F-470C-8AB1-14029EAFFB0B}" type="datetimeFigureOut">
               <a:rPr lang="zh-CN" altLang="en-US" smtClean="0"/>
-              <a:t>2015/2/1</a:t>
+              <a:t>2015/2/8</a:t>
             </a:fld>
             <a:endParaRPr lang="zh-CN" altLang="en-US"/>
           </a:p>
@@ -1897,7 +1898,7 @@
           <a:p>
             <a:fld id="{EF65D2AA-D73F-470C-8AB1-14029EAFFB0B}" type="datetimeFigureOut">
               <a:rPr lang="zh-CN" altLang="en-US" smtClean="0"/>
-              <a:t>2015/2/1</a:t>
+              <a:t>2015/2/8</a:t>
             </a:fld>
             <a:endParaRPr lang="zh-CN" altLang="en-US"/>
           </a:p>
@@ -1992,7 +1993,7 @@
           <a:p>
             <a:fld id="{EF65D2AA-D73F-470C-8AB1-14029EAFFB0B}" type="datetimeFigureOut">
               <a:rPr lang="zh-CN" altLang="en-US" smtClean="0"/>
-              <a:t>2015/2/1</a:t>
+              <a:t>2015/2/8</a:t>
             </a:fld>
             <a:endParaRPr lang="zh-CN" altLang="en-US"/>
           </a:p>
@@ -2269,7 +2270,7 @@
           <a:p>
             <a:fld id="{EF65D2AA-D73F-470C-8AB1-14029EAFFB0B}" type="datetimeFigureOut">
               <a:rPr lang="zh-CN" altLang="en-US" smtClean="0"/>
-              <a:t>2015/2/1</a:t>
+              <a:t>2015/2/8</a:t>
             </a:fld>
             <a:endParaRPr lang="zh-CN" altLang="en-US"/>
           </a:p>
@@ -2522,7 +2523,7 @@
           <a:p>
             <a:fld id="{EF65D2AA-D73F-470C-8AB1-14029EAFFB0B}" type="datetimeFigureOut">
               <a:rPr lang="zh-CN" altLang="en-US" smtClean="0"/>
-              <a:t>2015/2/1</a:t>
+              <a:t>2015/2/8</a:t>
             </a:fld>
             <a:endParaRPr lang="zh-CN" altLang="en-US"/>
           </a:p>
@@ -2735,7 +2736,7 @@
           <a:p>
             <a:fld id="{EF65D2AA-D73F-470C-8AB1-14029EAFFB0B}" type="datetimeFigureOut">
               <a:rPr lang="zh-CN" altLang="en-US" smtClean="0"/>
-              <a:t>2015/2/1</a:t>
+              <a:t>2015/2/8</a:t>
             </a:fld>
             <a:endParaRPr lang="zh-CN" altLang="en-US"/>
           </a:p>
@@ -6031,6 +6032,211 @@
     <p:extLst>
       <p:ext uri="{BB962C8B-B14F-4D97-AF65-F5344CB8AC3E}">
         <p14:creationId xmlns:p14="http://schemas.microsoft.com/office/powerpoint/2010/main" val="1691533334"/>
+      </p:ext>
+    </p:extLst>
+  </p:cSld>
+  <p:clrMapOvr>
+    <a:masterClrMapping/>
+  </p:clrMapOvr>
+</p:sld>
+</file>
+
+<file path=ppt/slides/slide17.xml><?xml version="1.0" encoding="utf-8"?>
+<p:sld xmlns:a="http://schemas.openxmlformats.org/drawingml/2006/main" xmlns:r="http://schemas.openxmlformats.org/officeDocument/2006/relationships" xmlns:p="http://schemas.openxmlformats.org/presentationml/2006/main">
+  <p:cSld>
+    <p:spTree>
+      <p:nvGrpSpPr>
+        <p:cNvPr id="1" name=""/>
+        <p:cNvGrpSpPr/>
+        <p:nvPr/>
+      </p:nvGrpSpPr>
+      <p:grpSpPr>
+        <a:xfrm>
+          <a:off x="0" y="0"/>
+          <a:ext cx="0" cy="0"/>
+          <a:chOff x="0" y="0"/>
+          <a:chExt cx="0" cy="0"/>
+        </a:xfrm>
+      </p:grpSpPr>
+      <p:sp>
+        <p:nvSpPr>
+          <p:cNvPr id="2" name="标题 1"/>
+          <p:cNvSpPr>
+            <a:spLocks noGrp="1"/>
+          </p:cNvSpPr>
+          <p:nvPr>
+            <p:ph type="title"/>
+          </p:nvPr>
+        </p:nvSpPr>
+        <p:spPr/>
+        <p:txBody>
+          <a:bodyPr/>
+          <a:lstStyle/>
+          <a:p>
+            <a:endParaRPr lang="zh-CN" altLang="en-US"/>
+          </a:p>
+        </p:txBody>
+      </p:sp>
+      <p:sp>
+        <p:nvSpPr>
+          <p:cNvPr id="9" name="任意多边形 8"/>
+          <p:cNvSpPr/>
+          <p:nvPr/>
+        </p:nvSpPr>
+        <p:spPr>
+          <a:xfrm>
+            <a:off x="1094433" y="2924948"/>
+            <a:ext cx="2685496" cy="1876462"/>
+          </a:xfrm>
+          <a:custGeom>
+            <a:avLst/>
+            <a:gdLst>
+              <a:gd name="connsiteX0" fmla="*/ 0 w 252118"/>
+              <a:gd name="connsiteY0" fmla="*/ 80881 h 404407"/>
+              <a:gd name="connsiteX1" fmla="*/ 126059 w 252118"/>
+              <a:gd name="connsiteY1" fmla="*/ 80881 h 404407"/>
+              <a:gd name="connsiteX2" fmla="*/ 126059 w 252118"/>
+              <a:gd name="connsiteY2" fmla="*/ 0 h 404407"/>
+              <a:gd name="connsiteX3" fmla="*/ 252118 w 252118"/>
+              <a:gd name="connsiteY3" fmla="*/ 202204 h 404407"/>
+              <a:gd name="connsiteX4" fmla="*/ 126059 w 252118"/>
+              <a:gd name="connsiteY4" fmla="*/ 404407 h 404407"/>
+              <a:gd name="connsiteX5" fmla="*/ 126059 w 252118"/>
+              <a:gd name="connsiteY5" fmla="*/ 323526 h 404407"/>
+              <a:gd name="connsiteX6" fmla="*/ 0 w 252118"/>
+              <a:gd name="connsiteY6" fmla="*/ 323526 h 404407"/>
+              <a:gd name="connsiteX7" fmla="*/ 0 w 252118"/>
+              <a:gd name="connsiteY7" fmla="*/ 80881 h 404407"/>
+              <a:gd name="connsiteX0" fmla="*/ 0 w 252118"/>
+              <a:gd name="connsiteY0" fmla="*/ 80881 h 404407"/>
+              <a:gd name="connsiteX1" fmla="*/ 126059 w 252118"/>
+              <a:gd name="connsiteY1" fmla="*/ 80881 h 404407"/>
+              <a:gd name="connsiteX2" fmla="*/ 126059 w 252118"/>
+              <a:gd name="connsiteY2" fmla="*/ 0 h 404407"/>
+              <a:gd name="connsiteX3" fmla="*/ 252118 w 252118"/>
+              <a:gd name="connsiteY3" fmla="*/ 202204 h 404407"/>
+              <a:gd name="connsiteX4" fmla="*/ 126059 w 252118"/>
+              <a:gd name="connsiteY4" fmla="*/ 404407 h 404407"/>
+              <a:gd name="connsiteX5" fmla="*/ 126059 w 252118"/>
+              <a:gd name="connsiteY5" fmla="*/ 323526 h 404407"/>
+              <a:gd name="connsiteX6" fmla="*/ 0 w 252118"/>
+              <a:gd name="connsiteY6" fmla="*/ 80881 h 404407"/>
+              <a:gd name="connsiteX0" fmla="*/ 0 w 126059"/>
+              <a:gd name="connsiteY0" fmla="*/ 323526 h 404407"/>
+              <a:gd name="connsiteX1" fmla="*/ 0 w 126059"/>
+              <a:gd name="connsiteY1" fmla="*/ 80881 h 404407"/>
+              <a:gd name="connsiteX2" fmla="*/ 0 w 126059"/>
+              <a:gd name="connsiteY2" fmla="*/ 0 h 404407"/>
+              <a:gd name="connsiteX3" fmla="*/ 126059 w 126059"/>
+              <a:gd name="connsiteY3" fmla="*/ 202204 h 404407"/>
+              <a:gd name="connsiteX4" fmla="*/ 0 w 126059"/>
+              <a:gd name="connsiteY4" fmla="*/ 404407 h 404407"/>
+              <a:gd name="connsiteX5" fmla="*/ 0 w 126059"/>
+              <a:gd name="connsiteY5" fmla="*/ 323526 h 404407"/>
+            </a:gdLst>
+            <a:ahLst/>
+            <a:cxnLst>
+              <a:cxn ang="0">
+                <a:pos x="connsiteX0" y="connsiteY0"/>
+              </a:cxn>
+              <a:cxn ang="0">
+                <a:pos x="connsiteX1" y="connsiteY1"/>
+              </a:cxn>
+              <a:cxn ang="0">
+                <a:pos x="connsiteX2" y="connsiteY2"/>
+              </a:cxn>
+              <a:cxn ang="0">
+                <a:pos x="connsiteX3" y="connsiteY3"/>
+              </a:cxn>
+              <a:cxn ang="0">
+                <a:pos x="connsiteX4" y="connsiteY4"/>
+              </a:cxn>
+              <a:cxn ang="0">
+                <a:pos x="connsiteX5" y="connsiteY5"/>
+              </a:cxn>
+            </a:cxnLst>
+            <a:rect l="l" t="t" r="r" b="b"/>
+            <a:pathLst>
+              <a:path w="126059" h="404407">
+                <a:moveTo>
+                  <a:pt x="0" y="323526"/>
+                </a:moveTo>
+                <a:lnTo>
+                  <a:pt x="0" y="80881"/>
+                </a:lnTo>
+                <a:lnTo>
+                  <a:pt x="0" y="0"/>
+                </a:lnTo>
+                <a:lnTo>
+                  <a:pt x="126059" y="202204"/>
+                </a:lnTo>
+                <a:lnTo>
+                  <a:pt x="0" y="404407"/>
+                </a:lnTo>
+                <a:lnTo>
+                  <a:pt x="0" y="323526"/>
+                </a:lnTo>
+                <a:close/>
+              </a:path>
+            </a:pathLst>
+          </a:custGeom>
+          <a:solidFill>
+            <a:srgbClr val="FF0000"/>
+          </a:solidFill>
+          <a:ln w="254000" cap="sq" cmpd="sng">
+            <a:solidFill>
+              <a:schemeClr val="tx1"/>
+            </a:solidFill>
+            <a:round/>
+          </a:ln>
+        </p:spPr>
+        <p:style>
+          <a:lnRef idx="0">
+            <a:schemeClr val="accent2"/>
+          </a:lnRef>
+          <a:fillRef idx="3">
+            <a:schemeClr val="accent2"/>
+          </a:fillRef>
+          <a:effectRef idx="3">
+            <a:schemeClr val="accent2"/>
+          </a:effectRef>
+          <a:fontRef idx="minor">
+            <a:schemeClr val="lt1"/>
+          </a:fontRef>
+        </p:style>
+        <p:txBody>
+          <a:bodyPr spcFirstLastPara="0" vert="horz" wrap="square" lIns="75635" tIns="80882" rIns="1" bIns="80881" numCol="1" spcCol="1270" anchor="ctr" anchorCtr="0">
+            <a:noAutofit/>
+          </a:bodyPr>
+          <a:lstStyle/>
+          <a:p>
+            <a:pPr algn="ctr" defTabSz="755650">
+              <a:lnSpc>
+                <a:spcPct val="90000"/>
+              </a:lnSpc>
+              <a:spcBef>
+                <a:spcPct val="0"/>
+              </a:spcBef>
+              <a:spcAft>
+                <a:spcPct val="35000"/>
+              </a:spcAft>
+            </a:pPr>
+            <a:endParaRPr lang="zh-CN" altLang="en-US" sz="1700">
+              <a:effectLst>
+                <a:outerShdw blurRad="63500" sx="102000" sy="102000" algn="ctr" rotWithShape="0">
+                  <a:prstClr val="black">
+                    <a:alpha val="40000"/>
+                  </a:prstClr>
+                </a:outerShdw>
+              </a:effectLst>
+            </a:endParaRPr>
+          </a:p>
+        </p:txBody>
+      </p:sp>
+    </p:spTree>
+    <p:extLst>
+      <p:ext uri="{BB962C8B-B14F-4D97-AF65-F5344CB8AC3E}">
+        <p14:creationId xmlns:p14="http://schemas.microsoft.com/office/powerpoint/2010/main" val="4203673243"/>
       </p:ext>
     </p:extLst>
   </p:cSld>

</xml_diff>

<commit_message>
remodeling weapon and bullet system
</commit_message>
<xml_diff>
--- a/TankHero.pptx
+++ b/TankHero.pptx
@@ -304,7 +304,7 @@
           <a:p>
             <a:fld id="{EF65D2AA-D73F-470C-8AB1-14029EAFFB0B}" type="datetimeFigureOut">
               <a:rPr lang="zh-CN" altLang="en-US" smtClean="0"/>
-              <a:t>2015/2/8</a:t>
+              <a:t>2015/2/11</a:t>
             </a:fld>
             <a:endParaRPr lang="zh-CN" altLang="en-US"/>
           </a:p>
@@ -474,7 +474,7 @@
           <a:p>
             <a:fld id="{EF65D2AA-D73F-470C-8AB1-14029EAFFB0B}" type="datetimeFigureOut">
               <a:rPr lang="zh-CN" altLang="en-US" smtClean="0"/>
-              <a:t>2015/2/8</a:t>
+              <a:t>2015/2/11</a:t>
             </a:fld>
             <a:endParaRPr lang="zh-CN" altLang="en-US"/>
           </a:p>
@@ -654,7 +654,7 @@
           <a:p>
             <a:fld id="{EF65D2AA-D73F-470C-8AB1-14029EAFFB0B}" type="datetimeFigureOut">
               <a:rPr lang="zh-CN" altLang="en-US" smtClean="0"/>
-              <a:t>2015/2/8</a:t>
+              <a:t>2015/2/11</a:t>
             </a:fld>
             <a:endParaRPr lang="zh-CN" altLang="en-US"/>
           </a:p>
@@ -824,7 +824,7 @@
           <a:p>
             <a:fld id="{EF65D2AA-D73F-470C-8AB1-14029EAFFB0B}" type="datetimeFigureOut">
               <a:rPr lang="zh-CN" altLang="en-US" smtClean="0"/>
-              <a:t>2015/2/8</a:t>
+              <a:t>2015/2/11</a:t>
             </a:fld>
             <a:endParaRPr lang="zh-CN" altLang="en-US"/>
           </a:p>
@@ -1070,7 +1070,7 @@
           <a:p>
             <a:fld id="{EF65D2AA-D73F-470C-8AB1-14029EAFFB0B}" type="datetimeFigureOut">
               <a:rPr lang="zh-CN" altLang="en-US" smtClean="0"/>
-              <a:t>2015/2/8</a:t>
+              <a:t>2015/2/11</a:t>
             </a:fld>
             <a:endParaRPr lang="zh-CN" altLang="en-US"/>
           </a:p>
@@ -1358,7 +1358,7 @@
           <a:p>
             <a:fld id="{EF65D2AA-D73F-470C-8AB1-14029EAFFB0B}" type="datetimeFigureOut">
               <a:rPr lang="zh-CN" altLang="en-US" smtClean="0"/>
-              <a:t>2015/2/8</a:t>
+              <a:t>2015/2/11</a:t>
             </a:fld>
             <a:endParaRPr lang="zh-CN" altLang="en-US"/>
           </a:p>
@@ -1780,7 +1780,7 @@
           <a:p>
             <a:fld id="{EF65D2AA-D73F-470C-8AB1-14029EAFFB0B}" type="datetimeFigureOut">
               <a:rPr lang="zh-CN" altLang="en-US" smtClean="0"/>
-              <a:t>2015/2/8</a:t>
+              <a:t>2015/2/11</a:t>
             </a:fld>
             <a:endParaRPr lang="zh-CN" altLang="en-US"/>
           </a:p>
@@ -1898,7 +1898,7 @@
           <a:p>
             <a:fld id="{EF65D2AA-D73F-470C-8AB1-14029EAFFB0B}" type="datetimeFigureOut">
               <a:rPr lang="zh-CN" altLang="en-US" smtClean="0"/>
-              <a:t>2015/2/8</a:t>
+              <a:t>2015/2/11</a:t>
             </a:fld>
             <a:endParaRPr lang="zh-CN" altLang="en-US"/>
           </a:p>
@@ -1993,7 +1993,7 @@
           <a:p>
             <a:fld id="{EF65D2AA-D73F-470C-8AB1-14029EAFFB0B}" type="datetimeFigureOut">
               <a:rPr lang="zh-CN" altLang="en-US" smtClean="0"/>
-              <a:t>2015/2/8</a:t>
+              <a:t>2015/2/11</a:t>
             </a:fld>
             <a:endParaRPr lang="zh-CN" altLang="en-US"/>
           </a:p>
@@ -2270,7 +2270,7 @@
           <a:p>
             <a:fld id="{EF65D2AA-D73F-470C-8AB1-14029EAFFB0B}" type="datetimeFigureOut">
               <a:rPr lang="zh-CN" altLang="en-US" smtClean="0"/>
-              <a:t>2015/2/8</a:t>
+              <a:t>2015/2/11</a:t>
             </a:fld>
             <a:endParaRPr lang="zh-CN" altLang="en-US"/>
           </a:p>
@@ -2523,7 +2523,7 @@
           <a:p>
             <a:fld id="{EF65D2AA-D73F-470C-8AB1-14029EAFFB0B}" type="datetimeFigureOut">
               <a:rPr lang="zh-CN" altLang="en-US" smtClean="0"/>
-              <a:t>2015/2/8</a:t>
+              <a:t>2015/2/11</a:t>
             </a:fld>
             <a:endParaRPr lang="zh-CN" altLang="en-US"/>
           </a:p>
@@ -2736,7 +2736,7 @@
           <a:p>
             <a:fld id="{EF65D2AA-D73F-470C-8AB1-14029EAFFB0B}" type="datetimeFigureOut">
               <a:rPr lang="zh-CN" altLang="en-US" smtClean="0"/>
-              <a:t>2015/2/8</a:t>
+              <a:t>2015/2/11</a:t>
             </a:fld>
             <a:endParaRPr lang="zh-CN" altLang="en-US"/>
           </a:p>
@@ -3205,12 +3205,15 @@
           <p:nvPr/>
         </p:nvGrpSpPr>
         <p:grpSpPr>
-          <a:xfrm>
+          <a:xfrm rot="2700000">
             <a:off x="1094433" y="385614"/>
             <a:ext cx="6955125" cy="6955125"/>
             <a:chOff x="1094433" y="385614"/>
             <a:chExt cx="6955125" cy="6955125"/>
           </a:xfrm>
+          <a:solidFill>
+            <a:srgbClr val="FFFF00"/>
+          </a:solidFill>
         </p:grpSpPr>
         <p:grpSp>
           <p:nvGrpSpPr>
@@ -3225,6 +3228,7 @@
               <a:chOff x="1094433" y="2924944"/>
               <a:chExt cx="6955125" cy="1876466"/>
             </a:xfrm>
+            <a:grpFill/>
           </p:grpSpPr>
           <p:sp>
             <p:nvSpPr>
@@ -3329,6 +3333,7 @@
                   </a:path>
                 </a:pathLst>
               </a:custGeom>
+              <a:grpFill/>
               <a:ln w="254000" cap="sq" cmpd="sng">
                 <a:solidFill>
                   <a:schemeClr val="tx1"/>
@@ -3482,6 +3487,7 @@
                   </a:path>
                 </a:pathLst>
               </a:custGeom>
+              <a:grpFill/>
               <a:ln w="254000" cap="sq" cmpd="sng">
                 <a:solidFill>
                   <a:schemeClr val="tx1"/>
@@ -3546,6 +3552,7 @@
               <a:chOff x="1094433" y="2924944"/>
               <a:chExt cx="6955125" cy="1876466"/>
             </a:xfrm>
+            <a:grpFill/>
           </p:grpSpPr>
           <p:sp>
             <p:nvSpPr>
@@ -3650,6 +3657,7 @@
                   </a:path>
                 </a:pathLst>
               </a:custGeom>
+              <a:grpFill/>
               <a:ln w="254000" cap="sq" cmpd="sng">
                 <a:solidFill>
                   <a:schemeClr val="tx1"/>
@@ -3803,6 +3811,7 @@
                   </a:path>
                 </a:pathLst>
               </a:custGeom>
+              <a:grpFill/>
               <a:ln w="254000" cap="sq" cmpd="sng">
                 <a:solidFill>
                   <a:schemeClr val="tx1"/>
@@ -5593,17 +5602,17 @@
           </a:custGeom>
         </p:spPr>
         <p:style>
-          <a:lnRef idx="1">
+          <a:lnRef idx="0">
             <a:schemeClr val="accent2"/>
           </a:lnRef>
-          <a:fillRef idx="2">
+          <a:fillRef idx="3">
             <a:schemeClr val="accent2"/>
           </a:fillRef>
-          <a:effectRef idx="1">
+          <a:effectRef idx="3">
             <a:schemeClr val="accent2"/>
           </a:effectRef>
           <a:fontRef idx="minor">
-            <a:schemeClr val="dk1"/>
+            <a:schemeClr val="lt1"/>
           </a:fontRef>
         </p:style>
         <p:txBody>

</xml_diff>